<commit_message>
ENH:Small change to presentations
</commit_message>
<xml_diff>
--- a/presentations/Welcome.pptx
+++ b/presentations/Welcome.pptx
@@ -7076,8 +7076,8 @@
         </p:blipFill>
         <p:spPr>
           <a:xfrm>
-            <a:off x="4240232" y="808037"/>
-            <a:ext cx="4854536" cy="5440363"/>
+            <a:off x="4267200" y="808037"/>
+            <a:ext cx="4827568" cy="5410141"/>
           </a:xfrm>
         </p:spPr>
       </p:pic>

</xml_diff>